<commit_message>
Modificações na apresentação e comentários de código
</commit_message>
<xml_diff>
--- a/presentation_video.pptx
+++ b/presentation_video.pptx
@@ -12,6 +12,7 @@
     <p:sldId id="260" r:id="rId6"/>
     <p:sldId id="261" r:id="rId7"/>
     <p:sldId id="262" r:id="rId8"/>
+    <p:sldId id="263" r:id="rId9"/>
   </p:sldIdLst>
   <p:sldSz cx="12192000" cy="6858000"/>
   <p:notesSz cx="6858000" cy="9144000"/>
@@ -110,6 +111,11 @@
       </a:defRPr>
     </a:lvl9pPr>
   </p:defaultTextStyle>
+  <p:extLst>
+    <p:ext uri="{EFAFB233-063F-42B5-8137-9DF3F51BA10A}">
+      <p15:sldGuideLst xmlns:p15="http://schemas.microsoft.com/office/powerpoint/2012/main"/>
+    </p:ext>
+  </p:extLst>
 </p:presentation>
 </file>
 
@@ -260,7 +266,7 @@
           <a:p>
             <a:fld id="{82FF8174-5DD9-BC46-A851-AF10E18BD900}" type="datetimeFigureOut">
               <a:rPr lang="en-US" smtClean="0"/>
-              <a:t>6/24/18</a:t>
+              <a:t>6/25/18</a:t>
             </a:fld>
             <a:endParaRPr lang="en-US"/>
           </a:p>
@@ -458,7 +464,7 @@
           <a:p>
             <a:fld id="{82FF8174-5DD9-BC46-A851-AF10E18BD900}" type="datetimeFigureOut">
               <a:rPr lang="en-US" smtClean="0"/>
-              <a:t>6/24/18</a:t>
+              <a:t>6/25/18</a:t>
             </a:fld>
             <a:endParaRPr lang="en-US"/>
           </a:p>
@@ -666,7 +672,7 @@
           <a:p>
             <a:fld id="{82FF8174-5DD9-BC46-A851-AF10E18BD900}" type="datetimeFigureOut">
               <a:rPr lang="en-US" smtClean="0"/>
-              <a:t>6/24/18</a:t>
+              <a:t>6/25/18</a:t>
             </a:fld>
             <a:endParaRPr lang="en-US"/>
           </a:p>
@@ -864,7 +870,7 @@
           <a:p>
             <a:fld id="{82FF8174-5DD9-BC46-A851-AF10E18BD900}" type="datetimeFigureOut">
               <a:rPr lang="en-US" smtClean="0"/>
-              <a:t>6/24/18</a:t>
+              <a:t>6/25/18</a:t>
             </a:fld>
             <a:endParaRPr lang="en-US"/>
           </a:p>
@@ -1139,7 +1145,7 @@
           <a:p>
             <a:fld id="{82FF8174-5DD9-BC46-A851-AF10E18BD900}" type="datetimeFigureOut">
               <a:rPr lang="en-US" smtClean="0"/>
-              <a:t>6/24/18</a:t>
+              <a:t>6/25/18</a:t>
             </a:fld>
             <a:endParaRPr lang="en-US"/>
           </a:p>
@@ -1404,7 +1410,7 @@
           <a:p>
             <a:fld id="{82FF8174-5DD9-BC46-A851-AF10E18BD900}" type="datetimeFigureOut">
               <a:rPr lang="en-US" smtClean="0"/>
-              <a:t>6/24/18</a:t>
+              <a:t>6/25/18</a:t>
             </a:fld>
             <a:endParaRPr lang="en-US"/>
           </a:p>
@@ -1816,7 +1822,7 @@
           <a:p>
             <a:fld id="{82FF8174-5DD9-BC46-A851-AF10E18BD900}" type="datetimeFigureOut">
               <a:rPr lang="en-US" smtClean="0"/>
-              <a:t>6/24/18</a:t>
+              <a:t>6/25/18</a:t>
             </a:fld>
             <a:endParaRPr lang="en-US"/>
           </a:p>
@@ -1957,7 +1963,7 @@
           <a:p>
             <a:fld id="{82FF8174-5DD9-BC46-A851-AF10E18BD900}" type="datetimeFigureOut">
               <a:rPr lang="en-US" smtClean="0"/>
-              <a:t>6/24/18</a:t>
+              <a:t>6/25/18</a:t>
             </a:fld>
             <a:endParaRPr lang="en-US"/>
           </a:p>
@@ -2070,7 +2076,7 @@
           <a:p>
             <a:fld id="{82FF8174-5DD9-BC46-A851-AF10E18BD900}" type="datetimeFigureOut">
               <a:rPr lang="en-US" smtClean="0"/>
-              <a:t>6/24/18</a:t>
+              <a:t>6/25/18</a:t>
             </a:fld>
             <a:endParaRPr lang="en-US"/>
           </a:p>
@@ -2381,7 +2387,7 @@
           <a:p>
             <a:fld id="{82FF8174-5DD9-BC46-A851-AF10E18BD900}" type="datetimeFigureOut">
               <a:rPr lang="en-US" smtClean="0"/>
-              <a:t>6/24/18</a:t>
+              <a:t>6/25/18</a:t>
             </a:fld>
             <a:endParaRPr lang="en-US"/>
           </a:p>
@@ -2669,7 +2675,7 @@
           <a:p>
             <a:fld id="{82FF8174-5DD9-BC46-A851-AF10E18BD900}" type="datetimeFigureOut">
               <a:rPr lang="en-US" smtClean="0"/>
-              <a:t>6/24/18</a:t>
+              <a:t>6/25/18</a:t>
             </a:fld>
             <a:endParaRPr lang="en-US"/>
           </a:p>
@@ -2910,7 +2916,7 @@
           <a:p>
             <a:fld id="{82FF8174-5DD9-BC46-A851-AF10E18BD900}" type="datetimeFigureOut">
               <a:rPr lang="en-US" smtClean="0"/>
-              <a:t>6/24/18</a:t>
+              <a:t>6/25/18</a:t>
             </a:fld>
             <a:endParaRPr lang="en-US"/>
           </a:p>
@@ -3345,8 +3351,8 @@
         </p:nvSpPr>
         <p:spPr>
           <a:xfrm>
-            <a:off x="1524000" y="986319"/>
-            <a:ext cx="9144000" cy="3191464"/>
+            <a:off x="1359614" y="462337"/>
+            <a:ext cx="9144000" cy="5928189"/>
           </a:xfrm>
         </p:spPr>
         <p:txBody>
@@ -3356,9 +3362,31 @@
           <a:lstStyle/>
           <a:p>
             <a:r>
-              <a:rPr lang="en-US" sz="4900" dirty="0"/>
+              <a:rPr lang="en-US" sz="4000" dirty="0"/>
               <a:t>MO444 – </a:t>
             </a:r>
+            <a:r>
+              <a:rPr lang="en-US" sz="4000" dirty="0" err="1"/>
+              <a:t>Aprendizado</a:t>
+            </a:r>
+            <a:r>
+              <a:rPr lang="en-US" sz="4000" dirty="0"/>
+              <a:t> de </a:t>
+            </a:r>
+            <a:r>
+              <a:rPr lang="en-US" sz="4000" dirty="0" err="1"/>
+              <a:t>Máquina</a:t>
+            </a:r>
+            <a:r>
+              <a:rPr lang="en-US" sz="4000" dirty="0"/>
+              <a:t> </a:t>
+            </a:r>
+            <a:br>
+              <a:rPr lang="en-US" sz="4000" dirty="0"/>
+            </a:br>
+            <a:br>
+              <a:rPr lang="en-US" sz="4000" dirty="0"/>
+            </a:br>
             <a:r>
               <a:rPr lang="en-US" sz="4900" dirty="0" err="1"/>
               <a:t>Projeto</a:t>
@@ -3374,71 +3402,50 @@
               <a:rPr lang="en-US" dirty="0"/>
             </a:br>
             <a:r>
-              <a:rPr lang="en-US" dirty="0" err="1"/>
+              <a:rPr lang="en-US" b="1" dirty="0" err="1"/>
               <a:t>Classificação</a:t>
             </a:r>
             <a:r>
-              <a:rPr lang="en-US" dirty="0"/>
+              <a:rPr lang="en-US" b="1" dirty="0"/>
               <a:t> de </a:t>
             </a:r>
             <a:r>
-              <a:rPr lang="en-US" dirty="0" err="1"/>
+              <a:rPr lang="en-US" b="1" dirty="0" err="1"/>
               <a:t>estilos</a:t>
             </a:r>
             <a:r>
-              <a:rPr lang="en-US" dirty="0"/>
+              <a:rPr lang="en-US" b="1" dirty="0"/>
               <a:t> de </a:t>
             </a:r>
             <a:r>
-              <a:rPr lang="en-US" dirty="0" err="1"/>
+              <a:rPr lang="en-US" b="1" dirty="0" err="1"/>
               <a:t>cervejas</a:t>
             </a:r>
             <a:r>
-              <a:rPr lang="en-US" dirty="0"/>
-              <a:t> </a:t>
-            </a:r>
-            <a:r>
-              <a:rPr lang="en-US" dirty="0" err="1"/>
+              <a:rPr lang="en-US" b="1" dirty="0"/>
+              <a:t> </a:t>
+            </a:r>
+            <a:r>
+              <a:rPr lang="en-US" b="1" dirty="0" err="1"/>
               <a:t>artesanais</a:t>
             </a:r>
-            <a:endParaRPr lang="en-US" dirty="0"/>
-          </a:p>
-        </p:txBody>
-      </p:sp>
-      <p:sp>
-        <p:nvSpPr>
-          <p:cNvPr id="3" name="Subtitle 2">
-            <a:extLst>
-              <a:ext uri="{FF2B5EF4-FFF2-40B4-BE49-F238E27FC236}">
-                <a16:creationId xmlns:a16="http://schemas.microsoft.com/office/drawing/2014/main" id="{B928321E-7E36-3D47-B0AB-9A8E2B4FBBA9}"/>
-              </a:ext>
-            </a:extLst>
-          </p:cNvPr>
-          <p:cNvSpPr>
-            <a:spLocks noGrp="1"/>
-          </p:cNvSpPr>
-          <p:nvPr>
-            <p:ph type="subTitle" idx="1"/>
-          </p:nvPr>
-        </p:nvSpPr>
-        <p:spPr>
-          <a:xfrm>
-            <a:off x="1524000" y="4742470"/>
-            <a:ext cx="9144000" cy="1655762"/>
-          </a:xfrm>
-        </p:spPr>
-        <p:txBody>
-          <a:bodyPr/>
-          <a:lstStyle/>
-          <a:p>
-            <a:r>
-              <a:rPr lang="en-US" dirty="0"/>
+            <a:br>
+              <a:rPr lang="en-US" dirty="0"/>
+            </a:br>
+            <a:br>
+              <a:rPr lang="en-US" dirty="0"/>
+            </a:br>
+            <a:r>
+              <a:rPr lang="en-US" sz="2700" dirty="0"/>
               <a:t>Pedro Henrique M. X. </a:t>
             </a:r>
             <a:r>
-              <a:rPr lang="en-US" dirty="0" err="1"/>
+              <a:rPr lang="en-US" sz="2700" dirty="0" err="1"/>
               <a:t>Zacarin</a:t>
             </a:r>
+            <a:br>
+              <a:rPr lang="en-US" dirty="0"/>
+            </a:br>
             <a:endParaRPr lang="en-US" dirty="0"/>
           </a:p>
         </p:txBody>
@@ -3533,7 +3540,7 @@
           <a:p>
             <a:r>
               <a:rPr lang="en-US" dirty="0" err="1"/>
-              <a:t>Crescimento</a:t>
+              <a:t>Entusiasmo</a:t>
             </a:r>
             <a:r>
               <a:rPr lang="en-US" dirty="0"/>
@@ -3648,15 +3655,7 @@
             </a:r>
             <a:r>
               <a:rPr lang="en-US" dirty="0"/>
-              <a:t> </a:t>
-            </a:r>
-            <a:r>
-              <a:rPr lang="en-US" dirty="0" err="1"/>
-              <a:t>tem</a:t>
-            </a:r>
-            <a:r>
-              <a:rPr lang="en-US" dirty="0"/>
-              <a:t> </a:t>
+              <a:t> tem </a:t>
             </a:r>
             <a:r>
               <a:rPr lang="en-US" dirty="0" err="1"/>
@@ -3749,6 +3748,100 @@
           </a:p>
           <a:p>
             <a:r>
+              <a:rPr lang="en-US" dirty="0"/>
+              <a:t>O </a:t>
+            </a:r>
+            <a:r>
+              <a:rPr lang="en-US" dirty="0" err="1"/>
+              <a:t>processo</a:t>
+            </a:r>
+            <a:r>
+              <a:rPr lang="en-US" dirty="0"/>
+              <a:t> </a:t>
+            </a:r>
+            <a:r>
+              <a:rPr lang="en-US" dirty="0" err="1"/>
+              <a:t>produtivo</a:t>
+            </a:r>
+            <a:r>
+              <a:rPr lang="en-US" dirty="0"/>
+              <a:t> </a:t>
+            </a:r>
+            <a:r>
+              <a:rPr lang="en-US" dirty="0" err="1"/>
+              <a:t>contém</a:t>
+            </a:r>
+            <a:r>
+              <a:rPr lang="en-US" dirty="0"/>
+              <a:t> </a:t>
+            </a:r>
+            <a:r>
+              <a:rPr lang="en-US" dirty="0" err="1"/>
+              <a:t>várias</a:t>
+            </a:r>
+            <a:r>
+              <a:rPr lang="en-US" dirty="0"/>
+              <a:t> </a:t>
+            </a:r>
+            <a:r>
+              <a:rPr lang="en-US" dirty="0" err="1"/>
+              <a:t>características</a:t>
+            </a:r>
+            <a:r>
+              <a:rPr lang="en-US" dirty="0"/>
+              <a:t> </a:t>
+            </a:r>
+            <a:r>
+              <a:rPr lang="en-US" dirty="0" err="1"/>
+              <a:t>relacionadas</a:t>
+            </a:r>
+            <a:r>
+              <a:rPr lang="en-US" dirty="0"/>
+              <a:t> </a:t>
+            </a:r>
+            <a:r>
+              <a:rPr lang="en-US" dirty="0" err="1"/>
+              <a:t>à</a:t>
+            </a:r>
+            <a:r>
+              <a:rPr lang="en-US" dirty="0"/>
+              <a:t> </a:t>
+            </a:r>
+            <a:r>
+              <a:rPr lang="en-US" dirty="0" err="1"/>
+              <a:t>quantidade</a:t>
+            </a:r>
+            <a:r>
+              <a:rPr lang="en-US" dirty="0"/>
+              <a:t> de </a:t>
+            </a:r>
+            <a:r>
+              <a:rPr lang="en-US" dirty="0" err="1"/>
+              <a:t>açúcares</a:t>
+            </a:r>
+            <a:r>
+              <a:rPr lang="en-US" dirty="0"/>
+              <a:t> </a:t>
+            </a:r>
+            <a:r>
+              <a:rPr lang="en-US" dirty="0" err="1"/>
+              <a:t>inicial</a:t>
+            </a:r>
+            <a:r>
+              <a:rPr lang="en-US" dirty="0"/>
+              <a:t>, final, tempo de </a:t>
+            </a:r>
+            <a:r>
+              <a:rPr lang="en-US" dirty="0" err="1"/>
+              <a:t>cozimento</a:t>
+            </a:r>
+            <a:r>
+              <a:rPr lang="en-US" dirty="0"/>
+              <a:t>, etc.</a:t>
+            </a:r>
+          </a:p>
+          <a:p>
+            <a:r>
               <a:rPr lang="en-US" dirty="0" err="1"/>
               <a:t>Objetivo</a:t>
             </a:r>
@@ -3783,6 +3876,38 @@
             <a:r>
               <a:rPr lang="en-US" dirty="0" err="1"/>
               <a:t>cerveja</a:t>
+            </a:r>
+            <a:r>
+              <a:rPr lang="en-US" dirty="0"/>
+              <a:t> </a:t>
+            </a:r>
+            <a:r>
+              <a:rPr lang="en-US" dirty="0" err="1"/>
+              <a:t>através</a:t>
+            </a:r>
+            <a:r>
+              <a:rPr lang="en-US" dirty="0"/>
+              <a:t> de </a:t>
+            </a:r>
+            <a:r>
+              <a:rPr lang="en-US" dirty="0" err="1"/>
+              <a:t>características</a:t>
+            </a:r>
+            <a:r>
+              <a:rPr lang="en-US" dirty="0"/>
+              <a:t> do </a:t>
+            </a:r>
+            <a:r>
+              <a:rPr lang="en-US" dirty="0" err="1"/>
+              <a:t>processo</a:t>
+            </a:r>
+            <a:r>
+              <a:rPr lang="en-US" dirty="0"/>
+              <a:t> </a:t>
+            </a:r>
+            <a:r>
+              <a:rPr lang="en-US" dirty="0" err="1"/>
+              <a:t>produtivo</a:t>
             </a:r>
             <a:endParaRPr lang="en-US" dirty="0"/>
           </a:p>
@@ -3872,7 +3997,9 @@
           </a:xfrm>
         </p:spPr>
         <p:txBody>
-          <a:bodyPr/>
+          <a:bodyPr>
+            <a:normAutofit fontScale="92500" lnSpcReduction="10000"/>
+          </a:bodyPr>
           <a:lstStyle/>
           <a:p>
             <a:r>
@@ -3981,20 +4108,32 @@
           </a:p>
           <a:p>
             <a:r>
-              <a:rPr lang="en-US" dirty="0" err="1"/>
+              <a:rPr lang="en-US" b="1" dirty="0" err="1"/>
               <a:t>Altamente</a:t>
             </a:r>
             <a:r>
-              <a:rPr lang="en-US" dirty="0"/>
-              <a:t> </a:t>
-            </a:r>
-            <a:r>
-              <a:rPr lang="en-US" dirty="0" err="1"/>
+              <a:rPr lang="en-US" b="1" dirty="0"/>
+              <a:t> </a:t>
+            </a:r>
+            <a:r>
+              <a:rPr lang="en-US" b="1" dirty="0" err="1"/>
               <a:t>desbalanceado</a:t>
             </a:r>
             <a:r>
-              <a:rPr lang="en-US" dirty="0"/>
-              <a:t> – 13 </a:t>
+              <a:rPr lang="en-US" b="1" dirty="0"/>
+              <a:t> </a:t>
+            </a:r>
+            <a:r>
+              <a:rPr lang="en-US" dirty="0"/>
+              <a:t>– </a:t>
+            </a:r>
+            <a:r>
+              <a:rPr lang="en-US" dirty="0" err="1"/>
+              <a:t>os</a:t>
+            </a:r>
+            <a:r>
+              <a:rPr lang="en-US" dirty="0"/>
+              <a:t> 13 </a:t>
             </a:r>
             <a:r>
               <a:rPr lang="en-US" dirty="0" err="1"/>
@@ -4056,7 +4195,15 @@
           <a:p>
             <a:r>
               <a:rPr lang="en-US" dirty="0" err="1"/>
-              <a:t>Estilos</a:t>
+              <a:t>Diversos</a:t>
+            </a:r>
+            <a:r>
+              <a:rPr lang="en-US" dirty="0"/>
+              <a:t> </a:t>
+            </a:r>
+            <a:r>
+              <a:rPr lang="en-US" dirty="0" err="1"/>
+              <a:t>estilos</a:t>
             </a:r>
             <a:r>
               <a:rPr lang="en-US" dirty="0"/>
@@ -4064,7 +4211,7 @@
             </a:r>
             <a:r>
               <a:rPr lang="en-US" dirty="0" err="1"/>
-              <a:t>menos</a:t>
+              <a:t>pouquíssimos</a:t>
             </a:r>
             <a:r>
               <a:rPr lang="en-US" dirty="0"/>
@@ -4076,11 +4223,11 @@
             </a:r>
             <a:r>
               <a:rPr lang="en-US" dirty="0"/>
-              <a:t> </a:t>
-            </a:r>
-            <a:r>
-              <a:rPr lang="en-US" dirty="0" err="1"/>
-              <a:t>chegam</a:t>
+              <a:t>, </a:t>
+            </a:r>
+            <a:r>
+              <a:rPr lang="en-US" dirty="0" err="1"/>
+              <a:t>chegando</a:t>
             </a:r>
             <a:r>
               <a:rPr lang="en-US" dirty="0"/>
@@ -4088,46 +4235,172 @@
             </a:r>
             <a:r>
               <a:rPr lang="en-US" dirty="0" err="1"/>
-              <a:t>ter</a:t>
-            </a:r>
-            <a:r>
-              <a:rPr lang="en-US" dirty="0"/>
-              <a:t> </a:t>
-            </a:r>
-            <a:r>
-              <a:rPr lang="en-US" dirty="0" err="1"/>
               <a:t>somente</a:t>
             </a:r>
             <a:r>
               <a:rPr lang="en-US" dirty="0"/>
+              <a:t> 1</a:t>
+            </a:r>
+          </a:p>
+          <a:p>
+            <a:r>
+              <a:rPr lang="en-US" dirty="0" err="1"/>
+              <a:t>Após</a:t>
+            </a:r>
+            <a:r>
+              <a:rPr lang="en-US" dirty="0"/>
+              <a:t> </a:t>
+            </a:r>
+            <a:r>
+              <a:rPr lang="en-US" dirty="0" err="1"/>
+              <a:t>limpeza</a:t>
+            </a:r>
+            <a:r>
+              <a:rPr lang="en-US" dirty="0"/>
+              <a:t> do dataset com a </a:t>
+            </a:r>
+            <a:r>
+              <a:rPr lang="en-US" dirty="0" err="1"/>
+              <a:t>exclusão</a:t>
+            </a:r>
+            <a:r>
+              <a:rPr lang="en-US" dirty="0"/>
+              <a:t> de </a:t>
+            </a:r>
+            <a:r>
+              <a:rPr lang="en-US" dirty="0" err="1"/>
+              <a:t>estilos</a:t>
+            </a:r>
+            <a:r>
+              <a:rPr lang="en-US" dirty="0"/>
+              <a:t> com </a:t>
+            </a:r>
+            <a:r>
+              <a:rPr lang="en-US" dirty="0" err="1"/>
+              <a:t>somente</a:t>
+            </a:r>
+            <a:r>
+              <a:rPr lang="en-US" dirty="0"/>
               <a:t> 1 </a:t>
             </a:r>
             <a:r>
               <a:rPr lang="en-US" dirty="0" err="1"/>
-              <a:t>ocorrência</a:t>
+              <a:t>exemplo</a:t>
+            </a:r>
+            <a:r>
+              <a:rPr lang="en-US" dirty="0"/>
+              <a:t>, </a:t>
+            </a:r>
+            <a:r>
+              <a:rPr lang="en-US" dirty="0" err="1"/>
+              <a:t>exemplos</a:t>
+            </a:r>
+            <a:r>
+              <a:rPr lang="en-US" dirty="0"/>
+              <a:t> que </a:t>
+            </a:r>
+            <a:r>
+              <a:rPr lang="en-US" dirty="0" err="1"/>
+              <a:t>estavam</a:t>
+            </a:r>
+            <a:r>
+              <a:rPr lang="en-US" dirty="0"/>
+              <a:t> fora do </a:t>
+            </a:r>
+            <a:r>
+              <a:rPr lang="en-US" dirty="0" err="1"/>
+              <a:t>padrão</a:t>
+            </a:r>
+            <a:r>
+              <a:rPr lang="en-US" dirty="0"/>
+              <a:t> </a:t>
+            </a:r>
+            <a:r>
+              <a:rPr lang="en-US" dirty="0" err="1"/>
+              <a:t>ou</a:t>
+            </a:r>
+            <a:r>
+              <a:rPr lang="en-US" dirty="0"/>
+              <a:t> com </a:t>
+            </a:r>
+            <a:r>
+              <a:rPr lang="en-US" dirty="0" err="1"/>
+              <a:t>diversos</a:t>
+            </a:r>
+            <a:r>
+              <a:rPr lang="en-US" dirty="0"/>
+              <a:t> dados </a:t>
+            </a:r>
+            <a:r>
+              <a:rPr lang="en-US" dirty="0" err="1"/>
+              <a:t>faltantes</a:t>
+            </a:r>
+            <a:r>
+              <a:rPr lang="en-US" dirty="0"/>
+              <a:t>, o dataset final </a:t>
+            </a:r>
+            <a:r>
+              <a:rPr lang="en-US" dirty="0" err="1"/>
+              <a:t>passou</a:t>
+            </a:r>
+            <a:r>
+              <a:rPr lang="en-US" dirty="0"/>
+              <a:t> a </a:t>
+            </a:r>
+            <a:r>
+              <a:rPr lang="en-US" dirty="0" err="1"/>
+              <a:t>conter</a:t>
+            </a:r>
+            <a:r>
+              <a:rPr lang="en-US" dirty="0"/>
+              <a:t> </a:t>
+            </a:r>
+            <a:r>
+              <a:rPr lang="en-US" b="1" dirty="0"/>
+              <a:t>67768 </a:t>
+            </a:r>
+            <a:r>
+              <a:rPr lang="en-US" b="1" dirty="0" err="1"/>
+              <a:t>exemplos</a:t>
+            </a:r>
+            <a:r>
+              <a:rPr lang="en-US" dirty="0"/>
+              <a:t> de </a:t>
+            </a:r>
+            <a:r>
+              <a:rPr lang="en-US" b="1" dirty="0"/>
+              <a:t>168 </a:t>
+            </a:r>
+            <a:r>
+              <a:rPr lang="en-US" b="1" dirty="0" err="1"/>
+              <a:t>estilos</a:t>
+            </a:r>
+            <a:r>
+              <a:rPr lang="en-US" b="1" dirty="0"/>
+              <a:t> </a:t>
+            </a:r>
+            <a:r>
+              <a:rPr lang="en-US" dirty="0" err="1"/>
+              <a:t>distintos</a:t>
             </a:r>
             <a:endParaRPr lang="en-US" dirty="0"/>
           </a:p>
           <a:p>
             <a:r>
-              <a:rPr lang="en-US" dirty="0" err="1"/>
-              <a:t>Após</a:t>
-            </a:r>
-            <a:r>
-              <a:rPr lang="en-US" dirty="0"/>
-              <a:t> </a:t>
-            </a:r>
-            <a:r>
-              <a:rPr lang="en-US" dirty="0" err="1"/>
-              <a:t>limpeza</a:t>
-            </a:r>
-            <a:r>
-              <a:rPr lang="en-US" dirty="0"/>
-              <a:t> do dataset com a </a:t>
-            </a:r>
-            <a:r>
-              <a:rPr lang="en-US" dirty="0" err="1"/>
-              <a:t>exclusão</a:t>
+              <a:rPr lang="en-US" b="1" dirty="0"/>
+              <a:t>5 features </a:t>
+            </a:r>
+            <a:r>
+              <a:rPr lang="en-US" dirty="0" err="1"/>
+              <a:t>selecionadas</a:t>
+            </a:r>
+            <a:r>
+              <a:rPr lang="en-US" dirty="0"/>
+              <a:t>: </a:t>
+            </a:r>
+            <a:r>
+              <a:rPr lang="en-US" dirty="0" err="1"/>
+              <a:t>quantidade</a:t>
             </a:r>
             <a:r>
               <a:rPr lang="en-US" dirty="0"/>
@@ -4135,106 +4408,31 @@
             </a:r>
             <a:r>
               <a:rPr lang="en-US" dirty="0" err="1"/>
-              <a:t>estilos</a:t>
-            </a:r>
-            <a:r>
-              <a:rPr lang="en-US" dirty="0"/>
-              <a:t> com </a:t>
-            </a:r>
-            <a:r>
-              <a:rPr lang="en-US" dirty="0" err="1"/>
-              <a:t>somente</a:t>
-            </a:r>
-            <a:r>
-              <a:rPr lang="en-US" dirty="0"/>
-              <a:t> 1 </a:t>
-            </a:r>
-            <a:r>
-              <a:rPr lang="en-US" dirty="0" err="1"/>
-              <a:t>ocorrência</a:t>
-            </a:r>
-            <a:r>
-              <a:rPr lang="en-US" dirty="0"/>
-              <a:t> e </a:t>
-            </a:r>
-            <a:r>
-              <a:rPr lang="en-US" dirty="0" err="1"/>
-              <a:t>exemplos</a:t>
-            </a:r>
-            <a:r>
-              <a:rPr lang="en-US" dirty="0"/>
-              <a:t> que </a:t>
-            </a:r>
-            <a:r>
-              <a:rPr lang="en-US" dirty="0" err="1"/>
-              <a:t>estavam</a:t>
-            </a:r>
-            <a:r>
-              <a:rPr lang="en-US" dirty="0"/>
-              <a:t> fora do </a:t>
-            </a:r>
-            <a:r>
-              <a:rPr lang="en-US" dirty="0" err="1"/>
-              <a:t>padrão</a:t>
-            </a:r>
-            <a:r>
-              <a:rPr lang="en-US" dirty="0"/>
-              <a:t>, o dataset final </a:t>
-            </a:r>
-            <a:r>
-              <a:rPr lang="en-US" dirty="0" err="1"/>
-              <a:t>passou</a:t>
-            </a:r>
-            <a:r>
-              <a:rPr lang="en-US" dirty="0"/>
-              <a:t> a </a:t>
-            </a:r>
-            <a:r>
-              <a:rPr lang="en-US" dirty="0" err="1"/>
-              <a:t>conter</a:t>
-            </a:r>
-            <a:r>
-              <a:rPr lang="en-US" dirty="0"/>
-              <a:t> 67768 </a:t>
-            </a:r>
-            <a:r>
-              <a:rPr lang="en-US" dirty="0" err="1"/>
-              <a:t>exemplos</a:t>
-            </a:r>
-            <a:r>
-              <a:rPr lang="en-US" dirty="0"/>
-              <a:t> de 168 </a:t>
-            </a:r>
-            <a:r>
-              <a:rPr lang="en-US" dirty="0" err="1"/>
-              <a:t>estilos</a:t>
-            </a:r>
-            <a:r>
-              <a:rPr lang="en-US" dirty="0"/>
-              <a:t> </a:t>
-            </a:r>
-            <a:r>
-              <a:rPr lang="en-US" dirty="0" err="1"/>
-              <a:t>distintos</a:t>
-            </a:r>
-            <a:endParaRPr lang="en-US" dirty="0"/>
-          </a:p>
-          <a:p>
-            <a:r>
-              <a:rPr lang="en-US" dirty="0"/>
-              <a:t>5 features : </a:t>
-            </a:r>
-            <a:r>
-              <a:rPr lang="en-US" dirty="0" err="1"/>
-              <a:t>Gravidade</a:t>
-            </a:r>
-            <a:r>
-              <a:rPr lang="en-US" dirty="0"/>
-              <a:t> original, </a:t>
-            </a:r>
-            <a:r>
-              <a:rPr lang="en-US" dirty="0" err="1"/>
-              <a:t>gravidade</a:t>
+              <a:t>açúcares</a:t>
+            </a:r>
+            <a:r>
+              <a:rPr lang="en-US" dirty="0"/>
+              <a:t> </a:t>
+            </a:r>
+            <a:r>
+              <a:rPr lang="en-US" dirty="0" err="1"/>
+              <a:t>inicial</a:t>
+            </a:r>
+            <a:r>
+              <a:rPr lang="en-US" dirty="0"/>
+              <a:t>, </a:t>
+            </a:r>
+            <a:r>
+              <a:rPr lang="en-US" dirty="0" err="1"/>
+              <a:t>quantidade</a:t>
+            </a:r>
+            <a:r>
+              <a:rPr lang="en-US" dirty="0"/>
+              <a:t> de </a:t>
+            </a:r>
+            <a:r>
+              <a:rPr lang="en-US" dirty="0" err="1"/>
+              <a:t>açúcares</a:t>
             </a:r>
             <a:r>
               <a:rPr lang="en-US" dirty="0"/>
@@ -4268,7 +4466,50 @@
               <a:rPr lang="en-US" dirty="0" err="1"/>
               <a:t>cor</a:t>
             </a:r>
-            <a:endParaRPr lang="en-US" dirty="0"/>
+            <a:r>
+              <a:rPr lang="en-US" dirty="0"/>
+              <a:t> (</a:t>
+            </a:r>
+            <a:r>
+              <a:rPr lang="en-US" dirty="0" err="1"/>
+              <a:t>codificada</a:t>
+            </a:r>
+            <a:r>
+              <a:rPr lang="en-US" dirty="0"/>
+              <a:t> </a:t>
+            </a:r>
+            <a:r>
+              <a:rPr lang="en-US" dirty="0" err="1"/>
+              <a:t>em</a:t>
+            </a:r>
+            <a:r>
+              <a:rPr lang="en-US" dirty="0"/>
+              <a:t> </a:t>
+            </a:r>
+            <a:r>
+              <a:rPr lang="en-US" dirty="0" err="1"/>
+              <a:t>uma</a:t>
+            </a:r>
+            <a:r>
+              <a:rPr lang="en-US" dirty="0"/>
+              <a:t> </a:t>
+            </a:r>
+            <a:r>
+              <a:rPr lang="en-US" dirty="0" err="1"/>
+              <a:t>escala</a:t>
+            </a:r>
+            <a:r>
+              <a:rPr lang="en-US" dirty="0"/>
+              <a:t> de </a:t>
+            </a:r>
+            <a:r>
+              <a:rPr lang="en-US" dirty="0" err="1"/>
+              <a:t>cor</a:t>
+            </a:r>
+            <a:r>
+              <a:rPr lang="en-US" dirty="0"/>
+              <a:t> de 1 a 40)</a:t>
+            </a:r>
           </a:p>
         </p:txBody>
       </p:sp>
@@ -4357,7 +4598,9 @@
         </p:nvSpPr>
         <p:spPr/>
         <p:txBody>
-          <a:bodyPr/>
+          <a:bodyPr>
+            <a:normAutofit lnSpcReduction="10000"/>
+          </a:bodyPr>
           <a:lstStyle/>
           <a:p>
             <a:r>
@@ -4370,6 +4613,14 @@
             </a:r>
             <a:r>
               <a:rPr lang="en-US" dirty="0" err="1"/>
+              <a:t>propôs</a:t>
+            </a:r>
+            <a:r>
+              <a:rPr lang="en-US" dirty="0"/>
+              <a:t>-se </a:t>
+            </a:r>
+            <a:r>
+              <a:rPr lang="en-US" dirty="0" err="1"/>
               <a:t>utilizar</a:t>
             </a:r>
             <a:r>
@@ -4414,7 +4665,29 @@
             </a:r>
             <a:r>
               <a:rPr lang="en-US" dirty="0"/>
-              <a:t> performance: K-Nearest Neighbors, SVMs com </a:t>
+              <a:t> a performance de </a:t>
+            </a:r>
+            <a:r>
+              <a:rPr lang="en-US" dirty="0" err="1"/>
+              <a:t>cada</a:t>
+            </a:r>
+            <a:r>
+              <a:rPr lang="en-US" dirty="0"/>
+              <a:t> um: </a:t>
+            </a:r>
+          </a:p>
+          <a:p>
+            <a:pPr lvl="1"/>
+            <a:r>
+              <a:rPr lang="en-US" dirty="0"/>
+              <a:t>K-Nearest Neighbors</a:t>
+            </a:r>
+          </a:p>
+          <a:p>
+            <a:pPr lvl="1"/>
+            <a:r>
+              <a:rPr lang="en-US" dirty="0"/>
+              <a:t>SVMs com </a:t>
             </a:r>
             <a:r>
               <a:rPr lang="en-US" dirty="0" err="1"/>
@@ -4422,7 +4695,14 @@
             </a:r>
             <a:r>
               <a:rPr lang="en-US" dirty="0"/>
-              <a:t> One vs. One e Random Forests.</a:t>
+              <a:t> One vs. One</a:t>
+            </a:r>
+          </a:p>
+          <a:p>
+            <a:pPr lvl="1"/>
+            <a:r>
+              <a:rPr lang="en-US" dirty="0"/>
+              <a:t>Random Forests</a:t>
             </a:r>
           </a:p>
           <a:p>
@@ -4436,6 +4716,14 @@
             </a:r>
             <a:r>
               <a:rPr lang="en-US" dirty="0" err="1"/>
+              <a:t>propôs</a:t>
+            </a:r>
+            <a:r>
+              <a:rPr lang="en-US" dirty="0"/>
+              <a:t>-se </a:t>
+            </a:r>
+            <a:r>
+              <a:rPr lang="en-US" dirty="0" err="1"/>
               <a:t>dividir</a:t>
             </a:r>
             <a:r>
@@ -4560,7 +4848,23 @@
             </a:r>
             <a:r>
               <a:rPr lang="en-US" dirty="0"/>
-              <a:t> e </a:t>
+              <a:t>. </a:t>
+            </a:r>
+            <a:r>
+              <a:rPr lang="en-US" dirty="0" err="1"/>
+              <a:t>Após</a:t>
+            </a:r>
+            <a:r>
+              <a:rPr lang="en-US" dirty="0"/>
+              <a:t> a </a:t>
+            </a:r>
+            <a:r>
+              <a:rPr lang="en-US" dirty="0" err="1"/>
+              <a:t>divisão</a:t>
+            </a:r>
+            <a:r>
+              <a:rPr lang="en-US" dirty="0"/>
+              <a:t>, </a:t>
             </a:r>
             <a:r>
               <a:rPr lang="en-US" dirty="0" err="1"/>
@@ -4587,7 +4891,15 @@
               <a:t> </a:t>
             </a:r>
             <a:r>
-              <a:rPr lang="en-US"/>
+              <a:rPr lang="en-US" dirty="0" err="1"/>
+              <a:t>distintos</a:t>
+            </a:r>
+            <a:r>
+              <a:rPr lang="en-US" dirty="0"/>
+              <a:t> </a:t>
+            </a:r>
+            <a:r>
+              <a:rPr lang="en-US" dirty="0" err="1"/>
               <a:t>em</a:t>
             </a:r>
             <a:r>
@@ -4616,7 +4928,7 @@
             </a:r>
             <a:r>
               <a:rPr lang="en-US" dirty="0"/>
-              <a:t> (ensemble).</a:t>
+              <a:t> (ensemble)</a:t>
             </a:r>
           </a:p>
         </p:txBody>
@@ -4769,7 +5081,111 @@
             </a:r>
             <a:r>
               <a:rPr lang="en-US" sz="2400" dirty="0"/>
-              <a:t> das classes</a:t>
+              <a:t> das classes. K-folds </a:t>
+            </a:r>
+            <a:r>
+              <a:rPr lang="en-US" sz="2400" dirty="0" err="1"/>
+              <a:t>não</a:t>
+            </a:r>
+            <a:r>
+              <a:rPr lang="en-US" sz="2400" dirty="0"/>
+              <a:t> </a:t>
+            </a:r>
+            <a:r>
+              <a:rPr lang="en-US" sz="2400" dirty="0" err="1"/>
+              <a:t>foi</a:t>
+            </a:r>
+            <a:r>
+              <a:rPr lang="en-US" sz="2400" dirty="0"/>
+              <a:t> </a:t>
+            </a:r>
+            <a:r>
+              <a:rPr lang="en-US" sz="2400" dirty="0" err="1"/>
+              <a:t>utilizado</a:t>
+            </a:r>
+            <a:r>
+              <a:rPr lang="en-US" sz="2400" dirty="0"/>
+              <a:t> </a:t>
+            </a:r>
+            <a:r>
+              <a:rPr lang="en-US" sz="2400" dirty="0" err="1"/>
+              <a:t>por</a:t>
+            </a:r>
+            <a:r>
+              <a:rPr lang="en-US" sz="2400" dirty="0"/>
+              <a:t> </a:t>
+            </a:r>
+            <a:r>
+              <a:rPr lang="en-US" sz="2400" dirty="0" err="1"/>
+              <a:t>não</a:t>
+            </a:r>
+            <a:r>
+              <a:rPr lang="en-US" sz="2400" dirty="0"/>
+              <a:t> </a:t>
+            </a:r>
+            <a:r>
+              <a:rPr lang="en-US" sz="2400" dirty="0" err="1"/>
+              <a:t>ser</a:t>
+            </a:r>
+            <a:r>
+              <a:rPr lang="en-US" sz="2400" dirty="0"/>
+              <a:t> </a:t>
+            </a:r>
+            <a:r>
+              <a:rPr lang="en-US" sz="2400" dirty="0" err="1"/>
+              <a:t>possível</a:t>
+            </a:r>
+            <a:r>
+              <a:rPr lang="en-US" sz="2400" dirty="0"/>
+              <a:t> </a:t>
+            </a:r>
+            <a:r>
+              <a:rPr lang="en-US" sz="2400" dirty="0" err="1"/>
+              <a:t>manter</a:t>
+            </a:r>
+            <a:r>
+              <a:rPr lang="en-US" sz="2400" dirty="0"/>
+              <a:t> a </a:t>
+            </a:r>
+            <a:r>
+              <a:rPr lang="en-US" sz="2400" dirty="0" err="1"/>
+              <a:t>proporção</a:t>
+            </a:r>
+            <a:r>
+              <a:rPr lang="en-US" sz="2400" dirty="0"/>
+              <a:t> de classes </a:t>
+            </a:r>
+            <a:r>
+              <a:rPr lang="en-US" sz="2400" dirty="0" err="1"/>
+              <a:t>sem</a:t>
+            </a:r>
+            <a:r>
+              <a:rPr lang="en-US" sz="2400" dirty="0"/>
+              <a:t> </a:t>
+            </a:r>
+            <a:r>
+              <a:rPr lang="en-US" sz="2400" dirty="0" err="1"/>
+              <a:t>repetição</a:t>
+            </a:r>
+            <a:r>
+              <a:rPr lang="en-US" sz="2400" dirty="0"/>
+              <a:t> (</a:t>
+            </a:r>
+            <a:r>
+              <a:rPr lang="en-US" sz="2400" dirty="0" err="1"/>
+              <a:t>poucos</a:t>
+            </a:r>
+            <a:r>
+              <a:rPr lang="en-US" sz="2400" dirty="0"/>
+              <a:t> </a:t>
+            </a:r>
+            <a:r>
+              <a:rPr lang="en-US" sz="2400" dirty="0" err="1"/>
+              <a:t>exemplos</a:t>
+            </a:r>
+            <a:r>
+              <a:rPr lang="en-US" sz="2400" dirty="0"/>
+              <a:t>)</a:t>
             </a:r>
           </a:p>
           <a:p>
@@ -4867,7 +5283,7 @@
             </a:r>
             <a:r>
               <a:rPr lang="en-US" sz="2400" dirty="0"/>
-              <a:t> de 34,86% e 32,59% </a:t>
+              <a:t> de 34,86% e 32,59%, </a:t>
             </a:r>
             <a:r>
               <a:rPr lang="en-US" sz="2400" dirty="0" err="1"/>
@@ -4875,7 +5291,7 @@
             </a:r>
             <a:r>
               <a:rPr lang="en-US" sz="2400" dirty="0"/>
-              <a:t> para K = 50</a:t>
+              <a:t>, para K = 50</a:t>
             </a:r>
           </a:p>
           <a:p>
@@ -5000,7 +5416,7 @@
             </a:r>
             <a:r>
               <a:rPr lang="en-US" sz="2400" dirty="0"/>
-              <a:t>, com </a:t>
+              <a:t> com </a:t>
             </a:r>
             <a:r>
               <a:rPr lang="en-US" sz="2400" dirty="0" err="1"/>
@@ -5093,6 +5509,22 @@
             <a:r>
               <a:rPr lang="en-US" sz="2400" dirty="0" err="1"/>
               <a:t>árvores</a:t>
+            </a:r>
+            <a:r>
+              <a:rPr lang="en-US" sz="2400" dirty="0"/>
+              <a:t> </a:t>
+            </a:r>
+            <a:r>
+              <a:rPr lang="en-US" sz="2400" dirty="0" err="1"/>
+              <a:t>na</a:t>
+            </a:r>
+            <a:r>
+              <a:rPr lang="en-US" sz="2400" dirty="0"/>
+              <a:t> </a:t>
+            </a:r>
+            <a:r>
+              <a:rPr lang="en-US" sz="2400" dirty="0" err="1"/>
+              <a:t>floresta</a:t>
             </a:r>
             <a:r>
               <a:rPr lang="en-US" sz="2400" dirty="0"/>
@@ -5188,7 +5620,7 @@
         </p:spPr>
         <p:txBody>
           <a:bodyPr>
-            <a:normAutofit fontScale="92500"/>
+            <a:normAutofit fontScale="92500" lnSpcReduction="10000"/>
           </a:bodyPr>
           <a:lstStyle/>
           <a:p>
@@ -5368,31 +5800,355 @@
             </a:r>
             <a:r>
               <a:rPr lang="en-US" dirty="0"/>
-              <a:t> 15 </a:t>
-            </a:r>
-            <a:r>
-              <a:rPr lang="en-US" dirty="0" err="1"/>
+              <a:t> </a:t>
+            </a:r>
+            <a:r>
+              <a:rPr lang="en-US" b="1" dirty="0"/>
+              <a:t>15 </a:t>
+            </a:r>
+            <a:r>
+              <a:rPr lang="en-US" b="1" dirty="0" err="1"/>
               <a:t>estilos</a:t>
             </a:r>
             <a:r>
+              <a:rPr lang="en-US" b="1" dirty="0"/>
+              <a:t> </a:t>
+            </a:r>
+            <a:r>
+              <a:rPr lang="en-US" dirty="0"/>
+              <a:t>com </a:t>
+            </a:r>
+            <a:r>
+              <a:rPr lang="en-US" dirty="0" err="1"/>
+              <a:t>mais</a:t>
+            </a:r>
+            <a:r>
+              <a:rPr lang="en-US" dirty="0"/>
+              <a:t> </a:t>
+            </a:r>
+            <a:r>
+              <a:rPr lang="en-US" dirty="0" err="1"/>
+              <a:t>exemplos</a:t>
+            </a:r>
+            <a:r>
+              <a:rPr lang="en-US" dirty="0"/>
+              <a:t> (</a:t>
+            </a:r>
+            <a:r>
+              <a:rPr lang="en-US" b="1" dirty="0"/>
+              <a:t>total de 35464</a:t>
+            </a:r>
+            <a:r>
+              <a:rPr lang="en-US" dirty="0"/>
+              <a:t>) e um </a:t>
+            </a:r>
+            <a:r>
+              <a:rPr lang="en-US" dirty="0" err="1"/>
+              <a:t>segundo</a:t>
+            </a:r>
+            <a:r>
+              <a:rPr lang="en-US" dirty="0"/>
+              <a:t> </a:t>
+            </a:r>
+            <a:r>
+              <a:rPr lang="en-US" dirty="0" err="1"/>
+              <a:t>contendo</a:t>
+            </a:r>
+            <a:r>
+              <a:rPr lang="en-US" dirty="0"/>
+              <a:t> </a:t>
+            </a:r>
+            <a:r>
+              <a:rPr lang="en-US" b="1" dirty="0"/>
+              <a:t>153 </a:t>
+            </a:r>
+            <a:r>
+              <a:rPr lang="en-US" b="1" dirty="0" err="1"/>
+              <a:t>estilos</a:t>
+            </a:r>
+            <a:r>
+              <a:rPr lang="en-US" b="1" dirty="0"/>
+              <a:t> </a:t>
+            </a:r>
+            <a:r>
+              <a:rPr lang="en-US" dirty="0"/>
+              <a:t>com </a:t>
+            </a:r>
+            <a:r>
+              <a:rPr lang="en-US" dirty="0" err="1"/>
+              <a:t>menos</a:t>
+            </a:r>
+            <a:r>
+              <a:rPr lang="en-US" dirty="0"/>
+              <a:t> (</a:t>
+            </a:r>
+            <a:r>
+              <a:rPr lang="en-US" b="1" dirty="0"/>
+              <a:t>total de 32304</a:t>
+            </a:r>
+            <a:r>
+              <a:rPr lang="en-US" dirty="0"/>
+              <a:t>)</a:t>
+            </a:r>
+          </a:p>
+          <a:p>
+            <a:r>
+              <a:rPr lang="en-US" dirty="0"/>
+              <a:t>No </a:t>
+            </a:r>
+            <a:r>
+              <a:rPr lang="en-US" dirty="0" err="1"/>
+              <a:t>primeiro</a:t>
+            </a:r>
+            <a:r>
+              <a:rPr lang="en-US" dirty="0"/>
+              <a:t> dataset </a:t>
+            </a:r>
+            <a:r>
+              <a:rPr lang="en-US" dirty="0" err="1"/>
+              <a:t>resultante</a:t>
+            </a:r>
+            <a:r>
+              <a:rPr lang="en-US" dirty="0"/>
+              <a:t> </a:t>
+            </a:r>
+            <a:r>
+              <a:rPr lang="en-US" dirty="0" err="1"/>
+              <a:t>foi</a:t>
+            </a:r>
+            <a:r>
+              <a:rPr lang="en-US" dirty="0"/>
+              <a:t> </a:t>
+            </a:r>
+            <a:r>
+              <a:rPr lang="en-US" dirty="0" err="1"/>
+              <a:t>aplicado</a:t>
+            </a:r>
+            <a:r>
+              <a:rPr lang="en-US" dirty="0"/>
+              <a:t> o </a:t>
+            </a:r>
+            <a:r>
+              <a:rPr lang="en-US" dirty="0" err="1"/>
+              <a:t>algoritmo</a:t>
+            </a:r>
+            <a:r>
+              <a:rPr lang="en-US" dirty="0"/>
+              <a:t> de </a:t>
+            </a:r>
+            <a:r>
+              <a:rPr lang="en-US" b="1" dirty="0"/>
+              <a:t>Random Forests</a:t>
+            </a:r>
+            <a:r>
+              <a:rPr lang="en-US" dirty="0"/>
+              <a:t>, </a:t>
+            </a:r>
+            <a:r>
+              <a:rPr lang="en-US" dirty="0" err="1"/>
+              <a:t>enquanto</a:t>
+            </a:r>
+            <a:r>
+              <a:rPr lang="en-US" dirty="0"/>
+              <a:t> no </a:t>
+            </a:r>
+            <a:r>
+              <a:rPr lang="en-US" dirty="0" err="1"/>
+              <a:t>segundo</a:t>
+            </a:r>
+            <a:r>
+              <a:rPr lang="en-US" dirty="0"/>
+              <a:t>, </a:t>
+            </a:r>
+            <a:r>
+              <a:rPr lang="en-US" b="1" dirty="0"/>
+              <a:t>SVMs</a:t>
+            </a:r>
+            <a:r>
               <a:rPr lang="en-US" dirty="0"/>
               <a:t> com </a:t>
             </a:r>
             <a:r>
               <a:rPr lang="en-US" dirty="0" err="1"/>
-              <a:t>mais</a:t>
-            </a:r>
-            <a:r>
-              <a:rPr lang="en-US" dirty="0"/>
-              <a:t> </a:t>
-            </a:r>
-            <a:r>
-              <a:rPr lang="en-US" dirty="0" err="1"/>
-              <a:t>exemplos</a:t>
-            </a:r>
-            <a:r>
-              <a:rPr lang="en-US" dirty="0"/>
-              <a:t> (total de 35464) e um </a:t>
+              <a:t>abordagem</a:t>
+            </a:r>
+            <a:r>
+              <a:rPr lang="en-US" dirty="0"/>
+              <a:t> One vs. One e </a:t>
+            </a:r>
+            <a:r>
+              <a:rPr lang="en-US" b="1" dirty="0"/>
+              <a:t>Random Forests </a:t>
+            </a:r>
+            <a:r>
+              <a:rPr lang="en-US" dirty="0"/>
+              <a:t>para </a:t>
+            </a:r>
+            <a:r>
+              <a:rPr lang="en-US" dirty="0" err="1"/>
+              <a:t>avaliar</a:t>
+            </a:r>
+            <a:r>
+              <a:rPr lang="en-US" dirty="0"/>
+              <a:t> ambos </a:t>
+            </a:r>
+            <a:r>
+              <a:rPr lang="en-US" dirty="0" err="1"/>
+              <a:t>os</a:t>
+            </a:r>
+            <a:r>
+              <a:rPr lang="en-US" dirty="0"/>
+              <a:t> </a:t>
+            </a:r>
+            <a:r>
+              <a:rPr lang="en-US" dirty="0" err="1"/>
+              <a:t>resultados</a:t>
+            </a:r>
+            <a:endParaRPr lang="en-US" dirty="0"/>
+          </a:p>
+          <a:p>
+            <a:r>
+              <a:rPr lang="en-US" dirty="0"/>
+              <a:t>O </a:t>
+            </a:r>
+            <a:r>
+              <a:rPr lang="en-US" dirty="0" err="1"/>
+              <a:t>algoritmo</a:t>
+            </a:r>
+            <a:r>
+              <a:rPr lang="en-US" dirty="0"/>
+              <a:t> de </a:t>
+            </a:r>
+            <a:r>
+              <a:rPr lang="en-US" b="1" dirty="0"/>
+              <a:t>Random Forests </a:t>
+            </a:r>
+            <a:r>
+              <a:rPr lang="en-US" dirty="0" err="1"/>
+              <a:t>atingiu</a:t>
+            </a:r>
+            <a:r>
+              <a:rPr lang="en-US" dirty="0"/>
+              <a:t> </a:t>
+            </a:r>
+            <a:r>
+              <a:rPr lang="en-US" dirty="0" err="1"/>
+              <a:t>valores</a:t>
+            </a:r>
+            <a:r>
+              <a:rPr lang="en-US" dirty="0"/>
+              <a:t> de </a:t>
+            </a:r>
+            <a:r>
+              <a:rPr lang="en-US" dirty="0" err="1"/>
+              <a:t>acurácia</a:t>
+            </a:r>
+            <a:r>
+              <a:rPr lang="en-US" dirty="0"/>
+              <a:t> </a:t>
+            </a:r>
+            <a:r>
+              <a:rPr lang="en-US" dirty="0" err="1"/>
+              <a:t>superiores</a:t>
+            </a:r>
+            <a:r>
+              <a:rPr lang="en-US" dirty="0"/>
+              <a:t> para a </a:t>
+            </a:r>
+            <a:r>
+              <a:rPr lang="en-US" dirty="0" err="1"/>
+              <a:t>primeira</a:t>
+            </a:r>
+            <a:r>
+              <a:rPr lang="en-US" dirty="0"/>
+              <a:t> parte do dataset, </a:t>
+            </a:r>
+            <a:r>
+              <a:rPr lang="en-US" dirty="0" err="1"/>
+              <a:t>assim</a:t>
+            </a:r>
+            <a:r>
+              <a:rPr lang="en-US" dirty="0"/>
+              <a:t> </a:t>
+            </a:r>
+            <a:r>
+              <a:rPr lang="en-US" dirty="0" err="1"/>
+              <a:t>como</a:t>
+            </a:r>
+            <a:r>
+              <a:rPr lang="en-US" dirty="0"/>
+              <a:t> para a </a:t>
+            </a:r>
+            <a:r>
+              <a:rPr lang="en-US"/>
+              <a:t>segunda</a:t>
+            </a:r>
+            <a:endParaRPr lang="en-US" dirty="0"/>
+          </a:p>
+          <a:p>
+            <a:r>
+              <a:rPr lang="en-US" dirty="0" err="1"/>
+              <a:t>Considerando</a:t>
+            </a:r>
+            <a:r>
+              <a:rPr lang="en-US" dirty="0"/>
+              <a:t> a </a:t>
+            </a:r>
+            <a:r>
+              <a:rPr lang="en-US" dirty="0" err="1"/>
+              <a:t>probabilidade</a:t>
+            </a:r>
+            <a:r>
+              <a:rPr lang="en-US" dirty="0"/>
+              <a:t> de um </a:t>
+            </a:r>
+            <a:r>
+              <a:rPr lang="en-US" dirty="0" err="1"/>
+              <a:t>exemplo</a:t>
+            </a:r>
+            <a:r>
+              <a:rPr lang="en-US" dirty="0"/>
+              <a:t> </a:t>
+            </a:r>
+            <a:r>
+              <a:rPr lang="en-US" dirty="0" err="1"/>
+              <a:t>pertencer</a:t>
+            </a:r>
+            <a:r>
+              <a:rPr lang="en-US" dirty="0"/>
+              <a:t> </a:t>
+            </a:r>
+            <a:r>
+              <a:rPr lang="en-US" dirty="0" err="1"/>
+              <a:t>ao</a:t>
+            </a:r>
+            <a:r>
+              <a:rPr lang="en-US" dirty="0"/>
+              <a:t> </a:t>
+            </a:r>
+            <a:r>
+              <a:rPr lang="en-US" dirty="0" err="1"/>
+              <a:t>primeiro</a:t>
+            </a:r>
+            <a:r>
+              <a:rPr lang="en-US" dirty="0"/>
+              <a:t> conjunto </a:t>
+            </a:r>
+            <a:r>
+              <a:rPr lang="en-US" dirty="0" err="1"/>
+              <a:t>ou</a:t>
+            </a:r>
+            <a:r>
+              <a:rPr lang="en-US" dirty="0"/>
+              <a:t> </a:t>
+            </a:r>
+            <a:r>
+              <a:rPr lang="en-US" dirty="0" err="1"/>
+              <a:t>ao</a:t>
+            </a:r>
+            <a:r>
+              <a:rPr lang="en-US" dirty="0"/>
+              <a:t> </a:t>
             </a:r>
             <a:r>
               <a:rPr lang="en-US" dirty="0" err="1"/>
@@ -5400,53 +6156,39 @@
             </a:r>
             <a:r>
               <a:rPr lang="en-US" dirty="0"/>
-              <a:t> </a:t>
-            </a:r>
-            <a:r>
-              <a:rPr lang="en-US" dirty="0" err="1"/>
-              <a:t>contendo</a:t>
-            </a:r>
-            <a:r>
-              <a:rPr lang="en-US" dirty="0"/>
-              <a:t> 153 </a:t>
-            </a:r>
-            <a:r>
-              <a:rPr lang="en-US" dirty="0" err="1"/>
-              <a:t>estilos</a:t>
-            </a:r>
-            <a:r>
-              <a:rPr lang="en-US" dirty="0"/>
-              <a:t> com </a:t>
-            </a:r>
-            <a:r>
-              <a:rPr lang="en-US" dirty="0" err="1"/>
-              <a:t>menos</a:t>
-            </a:r>
-            <a:r>
-              <a:rPr lang="en-US" dirty="0"/>
-              <a:t> (total de 32304)</a:t>
-            </a:r>
-          </a:p>
-          <a:p>
-            <a:r>
-              <a:rPr lang="en-US" dirty="0"/>
-              <a:t>No </a:t>
-            </a:r>
-            <a:r>
-              <a:rPr lang="en-US" dirty="0" err="1"/>
-              <a:t>primeiro</a:t>
-            </a:r>
-            <a:r>
-              <a:rPr lang="en-US" dirty="0"/>
-              <a:t> dataset </a:t>
-            </a:r>
-            <a:r>
-              <a:rPr lang="en-US" dirty="0" err="1"/>
-              <a:t>resultante</a:t>
-            </a:r>
-            <a:r>
-              <a:rPr lang="en-US" dirty="0"/>
-              <a:t> </a:t>
+              <a:t> conjunto, a </a:t>
+            </a:r>
+            <a:r>
+              <a:rPr lang="en-US" dirty="0" err="1"/>
+              <a:t>acurácia</a:t>
+            </a:r>
+            <a:r>
+              <a:rPr lang="en-US" dirty="0"/>
+              <a:t> de </a:t>
+            </a:r>
+            <a:r>
+              <a:rPr lang="en-US" dirty="0" err="1"/>
+              <a:t>treinamento</a:t>
+            </a:r>
+            <a:r>
+              <a:rPr lang="en-US" dirty="0"/>
+              <a:t> e </a:t>
+            </a:r>
+            <a:r>
+              <a:rPr lang="en-US" dirty="0" err="1"/>
+              <a:t>validação</a:t>
+            </a:r>
+            <a:r>
+              <a:rPr lang="en-US" dirty="0"/>
+              <a:t> </a:t>
+            </a:r>
+            <a:r>
+              <a:rPr lang="en-US" dirty="0" err="1"/>
+              <a:t>combinada</a:t>
+            </a:r>
+            <a:r>
+              <a:rPr lang="en-US" dirty="0"/>
+              <a:t> final </a:t>
             </a:r>
             <a:r>
               <a:rPr lang="en-US" dirty="0" err="1"/>
@@ -5454,215 +6196,25 @@
             </a:r>
             <a:r>
               <a:rPr lang="en-US" dirty="0"/>
-              <a:t> </a:t>
-            </a:r>
-            <a:r>
-              <a:rPr lang="en-US" dirty="0" err="1"/>
-              <a:t>aplicado</a:t>
-            </a:r>
-            <a:r>
-              <a:rPr lang="en-US" dirty="0"/>
-              <a:t> o </a:t>
-            </a:r>
-            <a:r>
-              <a:rPr lang="en-US" dirty="0" err="1"/>
-              <a:t>algoritmo</a:t>
-            </a:r>
-            <a:r>
-              <a:rPr lang="en-US" dirty="0"/>
-              <a:t> de Random Forests, </a:t>
-            </a:r>
-            <a:r>
-              <a:rPr lang="en-US" dirty="0" err="1"/>
-              <a:t>enquanto</a:t>
-            </a:r>
-            <a:r>
-              <a:rPr lang="en-US" dirty="0"/>
-              <a:t> no </a:t>
-            </a:r>
-            <a:r>
-              <a:rPr lang="en-US" dirty="0" err="1"/>
-              <a:t>segundo</a:t>
-            </a:r>
-            <a:r>
-              <a:rPr lang="en-US" dirty="0"/>
-              <a:t>, SVMs com </a:t>
-            </a:r>
-            <a:r>
-              <a:rPr lang="en-US" dirty="0" err="1"/>
-              <a:t>abordagem</a:t>
-            </a:r>
-            <a:r>
-              <a:rPr lang="en-US" dirty="0"/>
-              <a:t> One vs. One e Random Forests para </a:t>
-            </a:r>
-            <a:r>
-              <a:rPr lang="en-US" dirty="0" err="1"/>
-              <a:t>avaliar</a:t>
-            </a:r>
-            <a:r>
-              <a:rPr lang="en-US" dirty="0"/>
-              <a:t> </a:t>
-            </a:r>
-            <a:r>
-              <a:rPr lang="en-US" dirty="0" err="1"/>
-              <a:t>qual</a:t>
-            </a:r>
-            <a:r>
-              <a:rPr lang="en-US" dirty="0"/>
-              <a:t> </a:t>
-            </a:r>
-            <a:r>
-              <a:rPr lang="en-US" dirty="0" err="1"/>
-              <a:t>gerasse</a:t>
-            </a:r>
-            <a:r>
-              <a:rPr lang="en-US" dirty="0"/>
-              <a:t> um </a:t>
-            </a:r>
-            <a:r>
-              <a:rPr lang="en-US" dirty="0" err="1"/>
-              <a:t>melhor</a:t>
-            </a:r>
-            <a:r>
-              <a:rPr lang="en-US" dirty="0"/>
-              <a:t> </a:t>
-            </a:r>
-            <a:r>
-              <a:rPr lang="en-US" dirty="0" err="1"/>
-              <a:t>resultado</a:t>
+              <a:t> de </a:t>
+            </a:r>
+            <a:r>
+              <a:rPr lang="en-US" b="1" dirty="0"/>
+              <a:t>67,9% e 45,8%</a:t>
+            </a:r>
+            <a:r>
+              <a:rPr lang="en-US" dirty="0"/>
+              <a:t>,</a:t>
+            </a:r>
+            <a:r>
+              <a:rPr lang="en-US" b="1" dirty="0"/>
+              <a:t> </a:t>
+            </a:r>
+            <a:r>
+              <a:rPr lang="en-US" dirty="0" err="1"/>
+              <a:t>respectivamente</a:t>
             </a:r>
             <a:endParaRPr lang="en-US" dirty="0"/>
-          </a:p>
-          <a:p>
-            <a:r>
-              <a:rPr lang="en-US" dirty="0" err="1"/>
-              <a:t>Considerando</a:t>
-            </a:r>
-            <a:r>
-              <a:rPr lang="en-US" dirty="0"/>
-              <a:t> a </a:t>
-            </a:r>
-            <a:r>
-              <a:rPr lang="en-US" dirty="0" err="1"/>
-              <a:t>probabilidade</a:t>
-            </a:r>
-            <a:r>
-              <a:rPr lang="en-US" dirty="0"/>
-              <a:t> de um </a:t>
-            </a:r>
-            <a:r>
-              <a:rPr lang="en-US" dirty="0" err="1"/>
-              <a:t>exemplo</a:t>
-            </a:r>
-            <a:r>
-              <a:rPr lang="en-US" dirty="0"/>
-              <a:t> </a:t>
-            </a:r>
-            <a:r>
-              <a:rPr lang="en-US" dirty="0" err="1"/>
-              <a:t>ser</a:t>
-            </a:r>
-            <a:r>
-              <a:rPr lang="en-US" dirty="0"/>
-              <a:t> </a:t>
-            </a:r>
-            <a:r>
-              <a:rPr lang="en-US" dirty="0" err="1"/>
-              <a:t>pertencente</a:t>
-            </a:r>
-            <a:r>
-              <a:rPr lang="en-US" dirty="0"/>
-              <a:t> </a:t>
-            </a:r>
-            <a:r>
-              <a:rPr lang="en-US" dirty="0" err="1"/>
-              <a:t>ao</a:t>
-            </a:r>
-            <a:r>
-              <a:rPr lang="en-US" dirty="0"/>
-              <a:t> </a:t>
-            </a:r>
-            <a:r>
-              <a:rPr lang="en-US" dirty="0" err="1"/>
-              <a:t>primeiro</a:t>
-            </a:r>
-            <a:r>
-              <a:rPr lang="en-US" dirty="0"/>
-              <a:t> conjunto </a:t>
-            </a:r>
-            <a:r>
-              <a:rPr lang="en-US" dirty="0" err="1"/>
-              <a:t>ou</a:t>
-            </a:r>
-            <a:r>
-              <a:rPr lang="en-US" dirty="0"/>
-              <a:t> </a:t>
-            </a:r>
-            <a:r>
-              <a:rPr lang="en-US" dirty="0" err="1"/>
-              <a:t>ao</a:t>
-            </a:r>
-            <a:r>
-              <a:rPr lang="en-US" dirty="0"/>
-              <a:t> </a:t>
-            </a:r>
-            <a:r>
-              <a:rPr lang="en-US" dirty="0" err="1"/>
-              <a:t>segundo</a:t>
-            </a:r>
-            <a:r>
-              <a:rPr lang="en-US" dirty="0"/>
-              <a:t> conjunto, a </a:t>
-            </a:r>
-            <a:r>
-              <a:rPr lang="en-US" dirty="0" err="1"/>
-              <a:t>acurácia</a:t>
-            </a:r>
-            <a:r>
-              <a:rPr lang="en-US" dirty="0"/>
-              <a:t> de </a:t>
-            </a:r>
-            <a:r>
-              <a:rPr lang="en-US" dirty="0" err="1"/>
-              <a:t>treinamento</a:t>
-            </a:r>
-            <a:r>
-              <a:rPr lang="en-US" dirty="0"/>
-              <a:t> </a:t>
-            </a:r>
-            <a:r>
-              <a:rPr lang="en-US" dirty="0" err="1"/>
-              <a:t>validação</a:t>
-            </a:r>
-            <a:r>
-              <a:rPr lang="en-US" dirty="0"/>
-              <a:t> </a:t>
-            </a:r>
-            <a:r>
-              <a:rPr lang="en-US" dirty="0" err="1"/>
-              <a:t>combinada</a:t>
-            </a:r>
-            <a:r>
-              <a:rPr lang="en-US" dirty="0"/>
-              <a:t> final </a:t>
-            </a:r>
-            <a:r>
-              <a:rPr lang="en-US" dirty="0" err="1"/>
-              <a:t>foi</a:t>
-            </a:r>
-            <a:r>
-              <a:rPr lang="en-US" dirty="0"/>
-              <a:t> de 67,9% e 45,8%, </a:t>
-            </a:r>
-            <a:r>
-              <a:rPr lang="en-US" dirty="0" err="1"/>
-              <a:t>respectivamente</a:t>
-            </a:r>
-            <a:r>
-              <a:rPr lang="en-US" dirty="0"/>
-              <a:t>.</a:t>
-            </a:r>
           </a:p>
           <a:p>
             <a:pPr marL="0" indent="0">
@@ -5750,7 +6302,7 @@
         <p:spPr/>
         <p:txBody>
           <a:bodyPr>
-            <a:normAutofit fontScale="92500" lnSpcReduction="10000"/>
+            <a:normAutofit lnSpcReduction="10000"/>
           </a:bodyPr>
           <a:lstStyle/>
           <a:p>
@@ -5816,19 +6368,11 @@
             </a:r>
             <a:r>
               <a:rPr lang="en-US" dirty="0"/>
-              <a:t> um com um </a:t>
-            </a:r>
-            <a:r>
-              <a:rPr lang="en-US" dirty="0" err="1"/>
-              <a:t>diferente</a:t>
-            </a:r>
-            <a:r>
-              <a:rPr lang="en-US" dirty="0"/>
-              <a:t> </a:t>
-            </a:r>
-            <a:r>
-              <a:rPr lang="en-US" dirty="0" err="1"/>
-              <a:t>classificador</a:t>
+              <a:t> um </a:t>
+            </a:r>
+            <a:r>
+              <a:rPr lang="en-US" dirty="0" err="1"/>
+              <a:t>separadamente</a:t>
             </a:r>
             <a:r>
               <a:rPr lang="en-US" dirty="0"/>
@@ -5912,11 +6456,13 @@
             </a:r>
             <a:r>
               <a:rPr lang="en-US" dirty="0"/>
-              <a:t> para a </a:t>
-            </a:r>
-            <a:r>
-              <a:rPr lang="en-US" dirty="0" err="1"/>
-              <a:t>aplicação</a:t>
+              <a:t>.</a:t>
+            </a:r>
+          </a:p>
+          <a:p>
+            <a:r>
+              <a:rPr lang="en-US" dirty="0" err="1"/>
+              <a:t>Apesar</a:t>
             </a:r>
             <a:r>
               <a:rPr lang="en-US" dirty="0"/>
@@ -5924,7 +6470,223 @@
             </a:r>
             <a:r>
               <a:rPr lang="en-US" dirty="0" err="1"/>
-              <a:t>algoritmos</a:t>
+              <a:t>ter</a:t>
+            </a:r>
+            <a:r>
+              <a:rPr lang="en-US" dirty="0"/>
+              <a:t> </a:t>
+            </a:r>
+            <a:r>
+              <a:rPr lang="en-US" dirty="0" err="1"/>
+              <a:t>obtido</a:t>
+            </a:r>
+            <a:r>
+              <a:rPr lang="en-US" dirty="0"/>
+              <a:t> um </a:t>
+            </a:r>
+            <a:r>
+              <a:rPr lang="en-US" dirty="0" err="1"/>
+              <a:t>resultado</a:t>
+            </a:r>
+            <a:r>
+              <a:rPr lang="en-US" dirty="0"/>
+              <a:t> </a:t>
+            </a:r>
+            <a:r>
+              <a:rPr lang="en-US" dirty="0" err="1"/>
+              <a:t>melhor</a:t>
+            </a:r>
+            <a:r>
+              <a:rPr lang="en-US" dirty="0"/>
+              <a:t> com a </a:t>
+            </a:r>
+            <a:r>
+              <a:rPr lang="en-US" dirty="0" err="1"/>
+              <a:t>segunda</a:t>
+            </a:r>
+            <a:r>
+              <a:rPr lang="en-US" dirty="0"/>
+              <a:t> </a:t>
+            </a:r>
+            <a:r>
+              <a:rPr lang="en-US" dirty="0" err="1"/>
+              <a:t>abordagem</a:t>
+            </a:r>
+            <a:r>
+              <a:rPr lang="en-US" dirty="0"/>
+              <a:t>, nota-se que a </a:t>
+            </a:r>
+            <a:r>
+              <a:rPr lang="en-US" dirty="0" err="1"/>
+              <a:t>acurácia</a:t>
+            </a:r>
+            <a:r>
+              <a:rPr lang="en-US" dirty="0"/>
+              <a:t> </a:t>
+            </a:r>
+            <a:r>
+              <a:rPr lang="en-US" dirty="0" err="1"/>
+              <a:t>ainda</a:t>
+            </a:r>
+            <a:r>
+              <a:rPr lang="en-US" dirty="0"/>
+              <a:t> </a:t>
+            </a:r>
+            <a:r>
+              <a:rPr lang="en-US" dirty="0" err="1"/>
+              <a:t>está</a:t>
+            </a:r>
+            <a:r>
+              <a:rPr lang="en-US" dirty="0"/>
+              <a:t> </a:t>
+            </a:r>
+            <a:r>
+              <a:rPr lang="en-US" dirty="0" err="1"/>
+              <a:t>muito</a:t>
+            </a:r>
+            <a:r>
+              <a:rPr lang="en-US" dirty="0"/>
+              <a:t> </a:t>
+            </a:r>
+            <a:r>
+              <a:rPr lang="en-US" dirty="0" err="1"/>
+              <a:t>aquém</a:t>
+            </a:r>
+            <a:r>
+              <a:rPr lang="en-US" dirty="0"/>
+              <a:t> de um </a:t>
+            </a:r>
+            <a:r>
+              <a:rPr lang="en-US" dirty="0" err="1"/>
+              <a:t>resultado</a:t>
+            </a:r>
+            <a:r>
+              <a:rPr lang="en-US" dirty="0"/>
+              <a:t> </a:t>
+            </a:r>
+            <a:r>
+              <a:rPr lang="en-US" dirty="0" err="1"/>
+              <a:t>satisfatório</a:t>
+            </a:r>
+            <a:r>
+              <a:rPr lang="en-US" dirty="0"/>
+              <a:t>. Tal </a:t>
+            </a:r>
+            <a:r>
+              <a:rPr lang="en-US" dirty="0" err="1"/>
+              <a:t>fato</a:t>
+            </a:r>
+            <a:r>
+              <a:rPr lang="en-US" dirty="0"/>
+              <a:t> </a:t>
+            </a:r>
+            <a:r>
+              <a:rPr lang="en-US" dirty="0" err="1"/>
+              <a:t>pode</a:t>
+            </a:r>
+            <a:r>
+              <a:rPr lang="en-US" dirty="0"/>
+              <a:t> </a:t>
+            </a:r>
+            <a:r>
+              <a:rPr lang="en-US" dirty="0" err="1"/>
+              <a:t>ser</a:t>
+            </a:r>
+            <a:r>
+              <a:rPr lang="en-US" dirty="0"/>
+              <a:t> </a:t>
+            </a:r>
+            <a:r>
+              <a:rPr lang="en-US" dirty="0" err="1"/>
+              <a:t>explicado</a:t>
+            </a:r>
+            <a:r>
+              <a:rPr lang="en-US" dirty="0"/>
+              <a:t> </a:t>
+            </a:r>
+            <a:r>
+              <a:rPr lang="en-US" dirty="0" err="1"/>
+              <a:t>pelas</a:t>
+            </a:r>
+            <a:r>
+              <a:rPr lang="en-US" dirty="0"/>
+              <a:t> </a:t>
+            </a:r>
+            <a:r>
+              <a:rPr lang="en-US" dirty="0" err="1"/>
+              <a:t>características</a:t>
+            </a:r>
+            <a:r>
+              <a:rPr lang="en-US" dirty="0"/>
+              <a:t> do </a:t>
+            </a:r>
+            <a:r>
+              <a:rPr lang="en-US" dirty="0" err="1"/>
+              <a:t>próprio</a:t>
+            </a:r>
+            <a:r>
+              <a:rPr lang="en-US" dirty="0"/>
+              <a:t> dataset, </a:t>
+            </a:r>
+            <a:r>
+              <a:rPr lang="en-US" dirty="0" err="1"/>
+              <a:t>onde</a:t>
+            </a:r>
+            <a:r>
+              <a:rPr lang="en-US" dirty="0"/>
+              <a:t> </a:t>
+            </a:r>
+            <a:r>
+              <a:rPr lang="en-US" dirty="0" err="1"/>
+              <a:t>muitas</a:t>
+            </a:r>
+            <a:r>
+              <a:rPr lang="en-US" dirty="0"/>
+              <a:t> </a:t>
+            </a:r>
+            <a:r>
+              <a:rPr lang="en-US" dirty="0" err="1"/>
+              <a:t>são</a:t>
+            </a:r>
+            <a:r>
+              <a:rPr lang="en-US" dirty="0"/>
+              <a:t> </a:t>
+            </a:r>
+            <a:r>
+              <a:rPr lang="en-US" dirty="0" err="1"/>
+              <a:t>comuns</a:t>
+            </a:r>
+            <a:r>
+              <a:rPr lang="en-US" dirty="0"/>
+              <a:t> entre </a:t>
+            </a:r>
+            <a:r>
+              <a:rPr lang="en-US" dirty="0" err="1"/>
+              <a:t>diversos</a:t>
+            </a:r>
+            <a:r>
+              <a:rPr lang="en-US" dirty="0"/>
+              <a:t> </a:t>
+            </a:r>
+            <a:r>
+              <a:rPr lang="en-US" dirty="0" err="1"/>
+              <a:t>estilos</a:t>
+            </a:r>
+            <a:r>
+              <a:rPr lang="en-US" dirty="0"/>
+              <a:t>, e </a:t>
+            </a:r>
+            <a:r>
+              <a:rPr lang="en-US" dirty="0" err="1"/>
+              <a:t>também</a:t>
+            </a:r>
+            <a:r>
+              <a:rPr lang="en-US" dirty="0"/>
+              <a:t> pela </a:t>
+            </a:r>
+            <a:r>
+              <a:rPr lang="en-US" dirty="0" err="1"/>
+              <a:t>falta</a:t>
             </a:r>
             <a:r>
               <a:rPr lang="en-US" dirty="0"/>
@@ -5932,69 +6694,165 @@
             </a:r>
             <a:r>
               <a:rPr lang="en-US" dirty="0" err="1"/>
+              <a:t>exemplos</a:t>
+            </a:r>
+            <a:r>
+              <a:rPr lang="en-US" dirty="0"/>
+              <a:t> </a:t>
+            </a:r>
+            <a:r>
+              <a:rPr lang="en-US" dirty="0" err="1"/>
+              <a:t>na</a:t>
+            </a:r>
+            <a:r>
+              <a:rPr lang="en-US" dirty="0"/>
+              <a:t> </a:t>
+            </a:r>
+            <a:r>
+              <a:rPr lang="en-US" dirty="0" err="1"/>
+              <a:t>maioria</a:t>
+            </a:r>
+            <a:r>
+              <a:rPr lang="en-US" dirty="0"/>
+              <a:t> </a:t>
+            </a:r>
+            <a:r>
+              <a:rPr lang="en-US" dirty="0" err="1"/>
+              <a:t>destes</a:t>
+            </a:r>
+            <a:r>
+              <a:rPr lang="en-US" dirty="0"/>
+              <a:t>. </a:t>
+            </a:r>
+          </a:p>
+          <a:p>
+            <a:r>
+              <a:rPr lang="en-US" dirty="0" err="1"/>
+              <a:t>Isso</a:t>
+            </a:r>
+            <a:r>
+              <a:rPr lang="en-US" dirty="0"/>
+              <a:t> </a:t>
+            </a:r>
+            <a:r>
+              <a:rPr lang="en-US" dirty="0" err="1"/>
+              <a:t>é</a:t>
+            </a:r>
+            <a:r>
+              <a:rPr lang="en-US" dirty="0"/>
+              <a:t> </a:t>
+            </a:r>
+            <a:r>
+              <a:rPr lang="en-US" dirty="0" err="1"/>
+              <a:t>reforçado</a:t>
+            </a:r>
+            <a:r>
+              <a:rPr lang="en-US" dirty="0"/>
+              <a:t> </a:t>
+            </a:r>
+            <a:r>
+              <a:rPr lang="en-US" dirty="0" err="1"/>
+              <a:t>pelo</a:t>
+            </a:r>
+            <a:r>
+              <a:rPr lang="en-US" dirty="0"/>
+              <a:t> </a:t>
+            </a:r>
+            <a:r>
+              <a:rPr lang="en-US" dirty="0" err="1"/>
+              <a:t>fato</a:t>
+            </a:r>
+            <a:r>
+              <a:rPr lang="en-US" dirty="0"/>
+              <a:t> que </a:t>
+            </a:r>
+            <a:r>
+              <a:rPr lang="en-US" dirty="0" err="1"/>
+              <a:t>mesmo</a:t>
+            </a:r>
+            <a:r>
+              <a:rPr lang="en-US" dirty="0"/>
+              <a:t> </a:t>
+            </a:r>
+            <a:r>
+              <a:rPr lang="en-US" dirty="0" err="1"/>
+              <a:t>na</a:t>
+            </a:r>
+            <a:r>
+              <a:rPr lang="en-US" dirty="0"/>
+              <a:t> </a:t>
+            </a:r>
+            <a:r>
+              <a:rPr lang="en-US" dirty="0" err="1"/>
               <a:t>classificação</a:t>
             </a:r>
             <a:r>
               <a:rPr lang="en-US" dirty="0"/>
-              <a:t>.</a:t>
-            </a:r>
-          </a:p>
-          <a:p>
-            <a:r>
-              <a:rPr lang="en-US" dirty="0" err="1"/>
-              <a:t>Apesar</a:t>
-            </a:r>
-            <a:r>
-              <a:rPr lang="en-US" dirty="0"/>
               <a:t> de </a:t>
             </a:r>
             <a:r>
               <a:rPr lang="en-US" dirty="0" err="1"/>
-              <a:t>ter</a:t>
-            </a:r>
-            <a:r>
-              <a:rPr lang="en-US" dirty="0"/>
-              <a:t> </a:t>
-            </a:r>
-            <a:r>
-              <a:rPr lang="en-US" dirty="0" err="1"/>
-              <a:t>obtido</a:t>
-            </a:r>
-            <a:r>
-              <a:rPr lang="en-US" dirty="0"/>
-              <a:t> um </a:t>
-            </a:r>
-            <a:r>
-              <a:rPr lang="en-US" dirty="0" err="1"/>
-              <a:t>resultado</a:t>
-            </a:r>
-            <a:r>
-              <a:rPr lang="en-US" dirty="0"/>
-              <a:t> </a:t>
-            </a:r>
-            <a:r>
-              <a:rPr lang="en-US" dirty="0" err="1"/>
-              <a:t>melhor</a:t>
-            </a:r>
-            <a:r>
-              <a:rPr lang="en-US" dirty="0"/>
-              <a:t> com a </a:t>
-            </a:r>
-            <a:r>
-              <a:rPr lang="en-US" dirty="0" err="1"/>
-              <a:t>segunda</a:t>
-            </a:r>
-            <a:r>
-              <a:rPr lang="en-US" dirty="0"/>
-              <a:t> </a:t>
-            </a:r>
-            <a:r>
-              <a:rPr lang="en-US" dirty="0" err="1"/>
-              <a:t>abordagem</a:t>
-            </a:r>
-            <a:r>
-              <a:rPr lang="en-US" dirty="0"/>
-              <a:t>, nota-se que a </a:t>
+              <a:t>somente</a:t>
+            </a:r>
+            <a:r>
+              <a:rPr lang="en-US" dirty="0"/>
+              <a:t> 15 classes (</a:t>
+            </a:r>
+            <a:r>
+              <a:rPr lang="en-US" dirty="0" err="1"/>
+              <a:t>primeiro</a:t>
+            </a:r>
+            <a:r>
+              <a:rPr lang="en-US" dirty="0"/>
+              <a:t> </a:t>
+            </a:r>
+            <a:r>
+              <a:rPr lang="en-US" dirty="0" err="1"/>
+              <a:t>conjunto</a:t>
+            </a:r>
+            <a:r>
+              <a:rPr lang="en-US" dirty="0"/>
+              <a:t>), com </a:t>
+            </a:r>
+            <a:r>
+              <a:rPr lang="en-US" dirty="0" err="1"/>
+              <a:t>vários</a:t>
+            </a:r>
+            <a:r>
+              <a:rPr lang="en-US" dirty="0"/>
+              <a:t> </a:t>
+            </a:r>
+            <a:r>
+              <a:rPr lang="en-US" dirty="0" err="1"/>
+              <a:t>exemplos</a:t>
+            </a:r>
+            <a:r>
+              <a:rPr lang="en-US" dirty="0"/>
+              <a:t> </a:t>
+            </a:r>
+            <a:r>
+              <a:rPr lang="en-US" dirty="0" err="1"/>
+              <a:t>cada</a:t>
+            </a:r>
+            <a:r>
+              <a:rPr lang="en-US" dirty="0"/>
+              <a:t> (</a:t>
+            </a:r>
+            <a:r>
+              <a:rPr lang="en-US" dirty="0" err="1"/>
+              <a:t>situação</a:t>
+            </a:r>
+            <a:r>
+              <a:rPr lang="en-US" dirty="0"/>
+              <a:t> </a:t>
+            </a:r>
+            <a:r>
+              <a:rPr lang="en-US" dirty="0" err="1"/>
+              <a:t>ótima</a:t>
+            </a:r>
+            <a:r>
+              <a:rPr lang="en-US" dirty="0"/>
+              <a:t>), a </a:t>
             </a:r>
             <a:r>
               <a:rPr lang="en-US" dirty="0" err="1"/>
@@ -6002,6 +6860,14 @@
             </a:r>
             <a:r>
               <a:rPr lang="en-US" dirty="0"/>
+              <a:t> de </a:t>
+            </a:r>
+            <a:r>
+              <a:rPr lang="en-US" dirty="0" err="1"/>
+              <a:t>validação</a:t>
+            </a:r>
+            <a:r>
+              <a:rPr lang="en-US" dirty="0"/>
               <a:t> </a:t>
             </a:r>
             <a:r>
@@ -6014,328 +6880,6 @@
             </a:r>
             <a:r>
               <a:rPr lang="en-US" dirty="0" err="1"/>
-              <a:t>está</a:t>
-            </a:r>
-            <a:r>
-              <a:rPr lang="en-US" dirty="0"/>
-              <a:t> </a:t>
-            </a:r>
-            <a:r>
-              <a:rPr lang="en-US" dirty="0" err="1"/>
-              <a:t>muito</a:t>
-            </a:r>
-            <a:r>
-              <a:rPr lang="en-US" dirty="0"/>
-              <a:t> </a:t>
-            </a:r>
-            <a:r>
-              <a:rPr lang="en-US" dirty="0" err="1"/>
-              <a:t>aquém</a:t>
-            </a:r>
-            <a:r>
-              <a:rPr lang="en-US" dirty="0"/>
-              <a:t> de um </a:t>
-            </a:r>
-            <a:r>
-              <a:rPr lang="en-US" dirty="0" err="1"/>
-              <a:t>resultado</a:t>
-            </a:r>
-            <a:r>
-              <a:rPr lang="en-US" dirty="0"/>
-              <a:t> </a:t>
-            </a:r>
-            <a:r>
-              <a:rPr lang="en-US" dirty="0" err="1"/>
-              <a:t>satisfatório</a:t>
-            </a:r>
-            <a:r>
-              <a:rPr lang="en-US" dirty="0"/>
-              <a:t>. Tal </a:t>
-            </a:r>
-            <a:r>
-              <a:rPr lang="en-US" dirty="0" err="1"/>
-              <a:t>fato</a:t>
-            </a:r>
-            <a:r>
-              <a:rPr lang="en-US" dirty="0"/>
-              <a:t> </a:t>
-            </a:r>
-            <a:r>
-              <a:rPr lang="en-US" dirty="0" err="1"/>
-              <a:t>pode</a:t>
-            </a:r>
-            <a:r>
-              <a:rPr lang="en-US" dirty="0"/>
-              <a:t> </a:t>
-            </a:r>
-            <a:r>
-              <a:rPr lang="en-US" dirty="0" err="1"/>
-              <a:t>ser</a:t>
-            </a:r>
-            <a:r>
-              <a:rPr lang="en-US" dirty="0"/>
-              <a:t> </a:t>
-            </a:r>
-            <a:r>
-              <a:rPr lang="en-US" dirty="0" err="1"/>
-              <a:t>explicado</a:t>
-            </a:r>
-            <a:r>
-              <a:rPr lang="en-US" dirty="0"/>
-              <a:t> </a:t>
-            </a:r>
-            <a:r>
-              <a:rPr lang="en-US" dirty="0" err="1"/>
-              <a:t>pelas</a:t>
-            </a:r>
-            <a:r>
-              <a:rPr lang="en-US" dirty="0"/>
-              <a:t> </a:t>
-            </a:r>
-            <a:r>
-              <a:rPr lang="en-US" dirty="0" err="1"/>
-              <a:t>características</a:t>
-            </a:r>
-            <a:r>
-              <a:rPr lang="en-US" dirty="0"/>
-              <a:t> do </a:t>
-            </a:r>
-            <a:r>
-              <a:rPr lang="en-US" dirty="0" err="1"/>
-              <a:t>próprio</a:t>
-            </a:r>
-            <a:r>
-              <a:rPr lang="en-US" dirty="0"/>
-              <a:t> dataset, </a:t>
-            </a:r>
-            <a:r>
-              <a:rPr lang="en-US" dirty="0" err="1"/>
-              <a:t>onde</a:t>
-            </a:r>
-            <a:r>
-              <a:rPr lang="en-US" dirty="0"/>
-              <a:t> </a:t>
-            </a:r>
-            <a:r>
-              <a:rPr lang="en-US" dirty="0" err="1"/>
-              <a:t>muitas</a:t>
-            </a:r>
-            <a:r>
-              <a:rPr lang="en-US" dirty="0"/>
-              <a:t> </a:t>
-            </a:r>
-            <a:r>
-              <a:rPr lang="en-US" dirty="0" err="1"/>
-              <a:t>são</a:t>
-            </a:r>
-            <a:r>
-              <a:rPr lang="en-US" dirty="0"/>
-              <a:t> </a:t>
-            </a:r>
-            <a:r>
-              <a:rPr lang="en-US" dirty="0" err="1"/>
-              <a:t>comuns</a:t>
-            </a:r>
-            <a:r>
-              <a:rPr lang="en-US" dirty="0"/>
-              <a:t> entre </a:t>
-            </a:r>
-            <a:r>
-              <a:rPr lang="en-US" dirty="0" err="1"/>
-              <a:t>diversos</a:t>
-            </a:r>
-            <a:r>
-              <a:rPr lang="en-US" dirty="0"/>
-              <a:t> </a:t>
-            </a:r>
-            <a:r>
-              <a:rPr lang="en-US" dirty="0" err="1"/>
-              <a:t>estilos</a:t>
-            </a:r>
-            <a:r>
-              <a:rPr lang="en-US" dirty="0"/>
-              <a:t>, e </a:t>
-            </a:r>
-            <a:r>
-              <a:rPr lang="en-US" dirty="0" err="1"/>
-              <a:t>também</a:t>
-            </a:r>
-            <a:r>
-              <a:rPr lang="en-US" dirty="0"/>
-              <a:t> pela </a:t>
-            </a:r>
-            <a:r>
-              <a:rPr lang="en-US" dirty="0" err="1"/>
-              <a:t>falta</a:t>
-            </a:r>
-            <a:r>
-              <a:rPr lang="en-US" dirty="0"/>
-              <a:t> de </a:t>
-            </a:r>
-            <a:r>
-              <a:rPr lang="en-US" dirty="0" err="1"/>
-              <a:t>exemplos</a:t>
-            </a:r>
-            <a:r>
-              <a:rPr lang="en-US" dirty="0"/>
-              <a:t> </a:t>
-            </a:r>
-            <a:r>
-              <a:rPr lang="en-US" dirty="0" err="1"/>
-              <a:t>na</a:t>
-            </a:r>
-            <a:r>
-              <a:rPr lang="en-US" dirty="0"/>
-              <a:t> </a:t>
-            </a:r>
-            <a:r>
-              <a:rPr lang="en-US" dirty="0" err="1"/>
-              <a:t>maioria</a:t>
-            </a:r>
-            <a:r>
-              <a:rPr lang="en-US" dirty="0"/>
-              <a:t> dos </a:t>
-            </a:r>
-            <a:r>
-              <a:rPr lang="en-US" dirty="0" err="1"/>
-              <a:t>estilos</a:t>
-            </a:r>
-            <a:r>
-              <a:rPr lang="en-US" dirty="0"/>
-              <a:t>. </a:t>
-            </a:r>
-          </a:p>
-          <a:p>
-            <a:r>
-              <a:rPr lang="en-US" dirty="0" err="1"/>
-              <a:t>Isso</a:t>
-            </a:r>
-            <a:r>
-              <a:rPr lang="en-US" dirty="0"/>
-              <a:t> </a:t>
-            </a:r>
-            <a:r>
-              <a:rPr lang="en-US" dirty="0" err="1"/>
-              <a:t>é</a:t>
-            </a:r>
-            <a:r>
-              <a:rPr lang="en-US" dirty="0"/>
-              <a:t> </a:t>
-            </a:r>
-            <a:r>
-              <a:rPr lang="en-US" dirty="0" err="1"/>
-              <a:t>reforçado</a:t>
-            </a:r>
-            <a:r>
-              <a:rPr lang="en-US" dirty="0"/>
-              <a:t> </a:t>
-            </a:r>
-            <a:r>
-              <a:rPr lang="en-US" dirty="0" err="1"/>
-              <a:t>pelo</a:t>
-            </a:r>
-            <a:r>
-              <a:rPr lang="en-US" dirty="0"/>
-              <a:t> </a:t>
-            </a:r>
-            <a:r>
-              <a:rPr lang="en-US" dirty="0" err="1"/>
-              <a:t>fato</a:t>
-            </a:r>
-            <a:r>
-              <a:rPr lang="en-US" dirty="0"/>
-              <a:t> que </a:t>
-            </a:r>
-            <a:r>
-              <a:rPr lang="en-US" dirty="0" err="1"/>
-              <a:t>mesmo</a:t>
-            </a:r>
-            <a:r>
-              <a:rPr lang="en-US" dirty="0"/>
-              <a:t> </a:t>
-            </a:r>
-            <a:r>
-              <a:rPr lang="en-US" dirty="0" err="1"/>
-              <a:t>na</a:t>
-            </a:r>
-            <a:r>
-              <a:rPr lang="en-US" dirty="0"/>
-              <a:t> </a:t>
-            </a:r>
-            <a:r>
-              <a:rPr lang="en-US" dirty="0" err="1"/>
-              <a:t>classificação</a:t>
-            </a:r>
-            <a:r>
-              <a:rPr lang="en-US" dirty="0"/>
-              <a:t> de </a:t>
-            </a:r>
-            <a:r>
-              <a:rPr lang="en-US" dirty="0" err="1"/>
-              <a:t>somente</a:t>
-            </a:r>
-            <a:r>
-              <a:rPr lang="en-US" dirty="0"/>
-              <a:t> 15 classes (</a:t>
-            </a:r>
-            <a:r>
-              <a:rPr lang="en-US" dirty="0" err="1"/>
-              <a:t>primeiro</a:t>
-            </a:r>
-            <a:r>
-              <a:rPr lang="en-US" dirty="0"/>
-              <a:t> conjunto) com </a:t>
-            </a:r>
-            <a:r>
-              <a:rPr lang="en-US" dirty="0" err="1"/>
-              <a:t>vários</a:t>
-            </a:r>
-            <a:r>
-              <a:rPr lang="en-US" dirty="0"/>
-              <a:t> </a:t>
-            </a:r>
-            <a:r>
-              <a:rPr lang="en-US" dirty="0" err="1"/>
-              <a:t>exemplos</a:t>
-            </a:r>
-            <a:r>
-              <a:rPr lang="en-US" dirty="0"/>
-              <a:t> </a:t>
-            </a:r>
-            <a:r>
-              <a:rPr lang="en-US" dirty="0" err="1"/>
-              <a:t>cada</a:t>
-            </a:r>
-            <a:r>
-              <a:rPr lang="en-US" dirty="0"/>
-              <a:t>, a </a:t>
-            </a:r>
-            <a:r>
-              <a:rPr lang="en-US" dirty="0" err="1"/>
-              <a:t>acurácia</a:t>
-            </a:r>
-            <a:r>
-              <a:rPr lang="en-US" dirty="0"/>
-              <a:t> de </a:t>
-            </a:r>
-            <a:r>
-              <a:rPr lang="en-US" dirty="0" err="1"/>
-              <a:t>validação</a:t>
-            </a:r>
-            <a:r>
-              <a:rPr lang="en-US" dirty="0"/>
-              <a:t> </a:t>
-            </a:r>
-            <a:r>
-              <a:rPr lang="en-US" dirty="0" err="1"/>
-              <a:t>ainda</a:t>
-            </a:r>
-            <a:r>
-              <a:rPr lang="en-US" dirty="0"/>
-              <a:t> </a:t>
-            </a:r>
-            <a:r>
-              <a:rPr lang="en-US" dirty="0" err="1"/>
               <a:t>foi</a:t>
             </a:r>
             <a:r>
@@ -6348,7 +6892,7 @@
             </a:r>
             <a:r>
               <a:rPr lang="en-US" dirty="0"/>
-              <a:t> (60,05%)</a:t>
+              <a:t>: 60,05%</a:t>
             </a:r>
           </a:p>
         </p:txBody>
@@ -6357,6 +6901,96 @@
     <p:extLst>
       <p:ext uri="{BB962C8B-B14F-4D97-AF65-F5344CB8AC3E}">
         <p14:creationId xmlns:p14="http://schemas.microsoft.com/office/powerpoint/2010/main" val="739189056"/>
+      </p:ext>
+    </p:extLst>
+  </p:cSld>
+  <p:clrMapOvr>
+    <a:masterClrMapping/>
+  </p:clrMapOvr>
+</p:sld>
+</file>
+
+<file path=ppt/slides/slide8.xml><?xml version="1.0" encoding="utf-8"?>
+<p:sld xmlns:a="http://schemas.openxmlformats.org/drawingml/2006/main" xmlns:r="http://schemas.openxmlformats.org/officeDocument/2006/relationships" xmlns:p="http://schemas.openxmlformats.org/presentationml/2006/main">
+  <p:cSld>
+    <p:spTree>
+      <p:nvGrpSpPr>
+        <p:cNvPr id="1" name=""/>
+        <p:cNvGrpSpPr/>
+        <p:nvPr/>
+      </p:nvGrpSpPr>
+      <p:grpSpPr>
+        <a:xfrm>
+          <a:off x="0" y="0"/>
+          <a:ext cx="0" cy="0"/>
+          <a:chOff x="0" y="0"/>
+          <a:chExt cx="0" cy="0"/>
+        </a:xfrm>
+      </p:grpSpPr>
+      <p:sp>
+        <p:nvSpPr>
+          <p:cNvPr id="3" name="Content Placeholder 2"/>
+          <p:cNvSpPr>
+            <a:spLocks noGrp="1"/>
+          </p:cNvSpPr>
+          <p:nvPr>
+            <p:ph idx="1"/>
+          </p:nvPr>
+        </p:nvSpPr>
+        <p:spPr>
+          <a:xfrm>
+            <a:off x="838200" y="729465"/>
+            <a:ext cx="10515600" cy="5447498"/>
+          </a:xfrm>
+        </p:spPr>
+        <p:txBody>
+          <a:bodyPr/>
+          <a:lstStyle/>
+          <a:p>
+            <a:pPr marL="0" indent="0" algn="ctr">
+              <a:buNone/>
+            </a:pPr>
+            <a:endParaRPr lang="en-US" b="1" dirty="0"/>
+          </a:p>
+          <a:p>
+            <a:pPr marL="0" indent="0" algn="ctr">
+              <a:buNone/>
+            </a:pPr>
+            <a:endParaRPr lang="en-US" b="1" dirty="0"/>
+          </a:p>
+          <a:p>
+            <a:pPr marL="0" indent="0" algn="ctr">
+              <a:buNone/>
+            </a:pPr>
+            <a:endParaRPr lang="en-US" b="1" dirty="0"/>
+          </a:p>
+          <a:p>
+            <a:pPr marL="0" indent="0" algn="ctr">
+              <a:buNone/>
+            </a:pPr>
+            <a:endParaRPr lang="en-US" b="1" dirty="0"/>
+          </a:p>
+          <a:p>
+            <a:pPr marL="0" indent="0" algn="ctr">
+              <a:buNone/>
+            </a:pPr>
+            <a:endParaRPr lang="en-US" b="1" dirty="0"/>
+          </a:p>
+          <a:p>
+            <a:pPr marL="0" indent="0" algn="ctr">
+              <a:buNone/>
+            </a:pPr>
+            <a:r>
+              <a:rPr lang="en-US" sz="3600" b="1" dirty="0"/>
+              <a:t>Obrigado!</a:t>
+            </a:r>
+          </a:p>
+        </p:txBody>
+      </p:sp>
+    </p:spTree>
+    <p:extLst>
+      <p:ext uri="{BB962C8B-B14F-4D97-AF65-F5344CB8AC3E}">
+        <p14:creationId xmlns:p14="http://schemas.microsoft.com/office/powerpoint/2010/main" val="2030838257"/>
       </p:ext>
     </p:extLst>
   </p:cSld>

</xml_diff>